<commit_message>
update to powerpoint slides
</commit_message>
<xml_diff>
--- a/Coding a Keylogger.pptx
+++ b/Coding a Keylogger.pptx
@@ -9,7 +9,7 @@
   </p:notesMasterIdLst>
   <p:sldIdLst>
     <p:sldId id="256" r:id="rId2"/>
-    <p:sldId id="258" r:id="rId3"/>
+    <p:sldId id="275" r:id="rId3"/>
     <p:sldId id="259" r:id="rId4"/>
     <p:sldId id="260" r:id="rId5"/>
     <p:sldId id="261" r:id="rId6"/>
@@ -2626,7 +2626,7 @@
           <a:p>
             <a:fld id="{5604AC08-4986-4C7E-BA45-0D3A5D2A37DC}" type="datetimeFigureOut">
               <a:rPr lang="en-US" smtClean="0"/>
-              <a:t>2/25/2021</a:t>
+              <a:t>2/26/2021</a:t>
             </a:fld>
             <a:endParaRPr lang="en-US"/>
           </a:p>
@@ -4319,7 +4319,7 @@
             <a:fld id="{B61BEF0D-F0BB-DE4B-95CE-6DB70DBA9567}" type="datetimeFigureOut">
               <a:rPr lang="en-US" dirty="0"/>
               <a:pPr/>
-              <a:t>2/25/2021</a:t>
+              <a:t>2/26/2021</a:t>
             </a:fld>
             <a:endParaRPr lang="en-US"/>
           </a:p>
@@ -4612,7 +4612,7 @@
             <a:fld id="{B61BEF0D-F0BB-DE4B-95CE-6DB70DBA9567}" type="datetimeFigureOut">
               <a:rPr lang="en-US" dirty="0"/>
               <a:pPr/>
-              <a:t>2/25/2021</a:t>
+              <a:t>2/26/2021</a:t>
             </a:fld>
             <a:endParaRPr lang="en-US"/>
           </a:p>
@@ -4861,7 +4861,7 @@
             <a:fld id="{B61BEF0D-F0BB-DE4B-95CE-6DB70DBA9567}" type="datetimeFigureOut">
               <a:rPr lang="en-US" dirty="0"/>
               <a:pPr/>
-              <a:t>2/25/2021</a:t>
+              <a:t>2/26/2021</a:t>
             </a:fld>
             <a:endParaRPr lang="en-US"/>
           </a:p>
@@ -5402,7 +5402,7 @@
             <a:fld id="{B61BEF0D-F0BB-DE4B-95CE-6DB70DBA9567}" type="datetimeFigureOut">
               <a:rPr lang="en-US" dirty="0"/>
               <a:pPr/>
-              <a:t>2/25/2021</a:t>
+              <a:t>2/26/2021</a:t>
             </a:fld>
             <a:endParaRPr lang="en-US"/>
           </a:p>
@@ -5651,7 +5651,7 @@
             <a:fld id="{B61BEF0D-F0BB-DE4B-95CE-6DB70DBA9567}" type="datetimeFigureOut">
               <a:rPr lang="en-US" dirty="0"/>
               <a:pPr/>
-              <a:t>2/25/2021</a:t>
+              <a:t>2/26/2021</a:t>
             </a:fld>
             <a:endParaRPr lang="en-US"/>
           </a:p>
@@ -6184,7 +6184,7 @@
             <a:fld id="{B61BEF0D-F0BB-DE4B-95CE-6DB70DBA9567}" type="datetimeFigureOut">
               <a:rPr lang="en-US" dirty="0"/>
               <a:pPr/>
-              <a:t>2/25/2021</a:t>
+              <a:t>2/26/2021</a:t>
             </a:fld>
             <a:endParaRPr lang="en-US"/>
           </a:p>
@@ -6482,7 +6482,7 @@
             <a:fld id="{B61BEF0D-F0BB-DE4B-95CE-6DB70DBA9567}" type="datetimeFigureOut">
               <a:rPr lang="en-US" dirty="0"/>
               <a:pPr/>
-              <a:t>2/25/2021</a:t>
+              <a:t>2/26/2021</a:t>
             </a:fld>
             <a:endParaRPr lang="en-US"/>
           </a:p>
@@ -6656,7 +6656,7 @@
             <a:fld id="{B61BEF0D-F0BB-DE4B-95CE-6DB70DBA9567}" type="datetimeFigureOut">
               <a:rPr lang="en-US" dirty="0"/>
               <a:pPr/>
-              <a:t>2/25/2021</a:t>
+              <a:t>2/26/2021</a:t>
             </a:fld>
             <a:endParaRPr lang="en-US"/>
           </a:p>
@@ -6836,7 +6836,7 @@
             <a:fld id="{B61BEF0D-F0BB-DE4B-95CE-6DB70DBA9567}" type="datetimeFigureOut">
               <a:rPr lang="en-US" dirty="0"/>
               <a:pPr/>
-              <a:t>2/25/2021</a:t>
+              <a:t>2/26/2021</a:t>
             </a:fld>
             <a:endParaRPr lang="en-US"/>
           </a:p>
@@ -7006,7 +7006,7 @@
             <a:fld id="{B61BEF0D-F0BB-DE4B-95CE-6DB70DBA9567}" type="datetimeFigureOut">
               <a:rPr lang="en-US" dirty="0"/>
               <a:pPr/>
-              <a:t>2/25/2021</a:t>
+              <a:t>2/26/2021</a:t>
             </a:fld>
             <a:endParaRPr lang="en-US"/>
           </a:p>
@@ -7258,7 +7258,7 @@
             <a:fld id="{B61BEF0D-F0BB-DE4B-95CE-6DB70DBA9567}" type="datetimeFigureOut">
               <a:rPr lang="en-US" dirty="0"/>
               <a:pPr/>
-              <a:t>2/25/2021</a:t>
+              <a:t>2/26/2021</a:t>
             </a:fld>
             <a:endParaRPr lang="en-US"/>
           </a:p>
@@ -7554,7 +7554,7 @@
             <a:fld id="{B61BEF0D-F0BB-DE4B-95CE-6DB70DBA9567}" type="datetimeFigureOut">
               <a:rPr lang="en-US" dirty="0"/>
               <a:pPr/>
-              <a:t>2/25/2021</a:t>
+              <a:t>2/26/2021</a:t>
             </a:fld>
             <a:endParaRPr lang="en-US"/>
           </a:p>
@@ -7995,7 +7995,7 @@
             <a:fld id="{B61BEF0D-F0BB-DE4B-95CE-6DB70DBA9567}" type="datetimeFigureOut">
               <a:rPr lang="en-US" dirty="0"/>
               <a:pPr/>
-              <a:t>2/25/2021</a:t>
+              <a:t>2/26/2021</a:t>
             </a:fld>
             <a:endParaRPr lang="en-US"/>
           </a:p>
@@ -8114,7 +8114,7 @@
             <a:fld id="{B61BEF0D-F0BB-DE4B-95CE-6DB70DBA9567}" type="datetimeFigureOut">
               <a:rPr lang="en-US" dirty="0"/>
               <a:pPr/>
-              <a:t>2/25/2021</a:t>
+              <a:t>2/26/2021</a:t>
             </a:fld>
             <a:endParaRPr lang="en-US"/>
           </a:p>
@@ -8211,7 +8211,7 @@
             <a:fld id="{B61BEF0D-F0BB-DE4B-95CE-6DB70DBA9567}" type="datetimeFigureOut">
               <a:rPr lang="en-US" dirty="0"/>
               <a:pPr/>
-              <a:t>2/25/2021</a:t>
+              <a:t>2/26/2021</a:t>
             </a:fld>
             <a:endParaRPr lang="en-US"/>
           </a:p>
@@ -8494,7 +8494,7 @@
             <a:fld id="{B61BEF0D-F0BB-DE4B-95CE-6DB70DBA9567}" type="datetimeFigureOut">
               <a:rPr lang="en-US" dirty="0"/>
               <a:pPr/>
-              <a:t>2/25/2021</a:t>
+              <a:t>2/26/2021</a:t>
             </a:fld>
             <a:endParaRPr lang="en-US"/>
           </a:p>
@@ -8782,7 +8782,7 @@
             <a:fld id="{B61BEF0D-F0BB-DE4B-95CE-6DB70DBA9567}" type="datetimeFigureOut">
               <a:rPr lang="en-US" dirty="0"/>
               <a:pPr/>
-              <a:t>2/25/2021</a:t>
+              <a:t>2/26/2021</a:t>
             </a:fld>
             <a:endParaRPr lang="en-US"/>
           </a:p>
@@ -9317,7 +9317,7 @@
             <a:fld id="{B61BEF0D-F0BB-DE4B-95CE-6DB70DBA9567}" type="datetimeFigureOut">
               <a:rPr lang="en-US" dirty="0"/>
               <a:pPr/>
-              <a:t>2/25/2021</a:t>
+              <a:t>2/26/2021</a:t>
             </a:fld>
             <a:endParaRPr lang="en-US"/>
           </a:p>
@@ -15615,6 +15615,16 @@
 <file path=ppt/slides/slide2.xml><?xml version="1.0" encoding="utf-8"?>
 <p:sld xmlns:a="http://schemas.openxmlformats.org/drawingml/2006/main" xmlns:r="http://schemas.openxmlformats.org/officeDocument/2006/relationships" xmlns:p="http://schemas.openxmlformats.org/presentationml/2006/main">
   <p:cSld>
+    <p:bg>
+      <p:bgPr>
+        <a:solidFill>
+          <a:schemeClr val="accent1">
+            <a:lumMod val="50000"/>
+          </a:schemeClr>
+        </a:solidFill>
+        <a:effectLst/>
+      </p:bgPr>
+    </p:bg>
     <p:spTree>
       <p:nvGrpSpPr>
         <p:cNvPr id="1" name=""/>
@@ -15629,6 +15639,611 @@
           <a:chExt cx="0" cy="0"/>
         </a:xfrm>
       </p:grpSpPr>
+      <p:grpSp>
+        <p:nvGrpSpPr>
+          <p:cNvPr id="33" name="Group 32">
+            <a:extLst>
+              <a:ext uri="{FF2B5EF4-FFF2-40B4-BE49-F238E27FC236}">
+                <a16:creationId xmlns:a16="http://schemas.microsoft.com/office/drawing/2014/main" id="{7CD2F605-77BD-4D9C-BC95-97EB75D69D88}"/>
+              </a:ext>
+              <a:ext uri="{C183D7F6-B498-43B3-948B-1728B52AA6E4}">
+                <adec:decorative xmlns:adec="http://schemas.microsoft.com/office/drawing/2017/decorative" val="1"/>
+              </a:ext>
+            </a:extLst>
+          </p:cNvPr>
+          <p:cNvGrpSpPr>
+            <a:grpSpLocks noGrp="1" noUngrp="1" noRot="1" noChangeAspect="1" noMove="1" noResize="1"/>
+          </p:cNvGrpSpPr>
+          <p:nvPr>
+            <p:extLst>
+              <p:ext uri="{386F3935-93C4-4BCD-93E2-E3B085C9AB24}">
+                <p16:designElem xmlns:p16="http://schemas.microsoft.com/office/powerpoint/2015/main" val="1"/>
+              </p:ext>
+            </p:extLst>
+          </p:nvPr>
+        </p:nvGrpSpPr>
+        <p:grpSpPr>
+          <a:xfrm>
+            <a:off x="819151" y="-7144"/>
+            <a:ext cx="7522369" cy="10294145"/>
+            <a:chOff x="2928938" y="-4763"/>
+            <a:chExt cx="5014912" cy="6862763"/>
+          </a:xfrm>
+        </p:grpSpPr>
+        <p:sp>
+          <p:nvSpPr>
+            <p:cNvPr id="34" name="Freeform 6">
+              <a:extLst>
+                <a:ext uri="{FF2B5EF4-FFF2-40B4-BE49-F238E27FC236}">
+                  <a16:creationId xmlns:a16="http://schemas.microsoft.com/office/drawing/2014/main" id="{40259AB5-8B5C-4CD4-AE10-7A177BB73836}"/>
+                </a:ext>
+                <a:ext uri="{C183D7F6-B498-43B3-948B-1728B52AA6E4}">
+                  <adec:decorative xmlns:adec="http://schemas.microsoft.com/office/drawing/2017/decorative" val="1"/>
+                </a:ext>
+              </a:extLst>
+            </p:cNvPr>
+            <p:cNvSpPr/>
+            <p:nvPr>
+              <p:extLst>
+                <p:ext uri="{386F3935-93C4-4BCD-93E2-E3B085C9AB24}">
+                  <p16:designElem xmlns:p16="http://schemas.microsoft.com/office/powerpoint/2015/main" val="1"/>
+                </p:ext>
+              </p:extLst>
+            </p:nvPr>
+          </p:nvSpPr>
+          <p:spPr bwMode="auto">
+            <a:xfrm>
+              <a:off x="3367088" y="-4763"/>
+              <a:ext cx="1063625" cy="2782888"/>
+            </a:xfrm>
+            <a:custGeom>
+              <a:avLst/>
+              <a:gdLst/>
+              <a:ahLst/>
+              <a:cxnLst/>
+              <a:rect l="0" t="0" r="r" b="b"/>
+              <a:pathLst>
+                <a:path w="670" h="1753">
+                  <a:moveTo>
+                    <a:pt x="0" y="1696"/>
+                  </a:moveTo>
+                  <a:lnTo>
+                    <a:pt x="225" y="1753"/>
+                  </a:lnTo>
+                  <a:lnTo>
+                    <a:pt x="670" y="0"/>
+                  </a:lnTo>
+                  <a:lnTo>
+                    <a:pt x="430" y="0"/>
+                  </a:lnTo>
+                  <a:lnTo>
+                    <a:pt x="0" y="1696"/>
+                  </a:lnTo>
+                  <a:close/>
+                </a:path>
+              </a:pathLst>
+            </a:custGeom>
+            <a:solidFill>
+              <a:schemeClr val="accent1"/>
+            </a:solidFill>
+            <a:ln>
+              <a:noFill/>
+            </a:ln>
+          </p:spPr>
+        </p:sp>
+        <p:sp>
+          <p:nvSpPr>
+            <p:cNvPr id="35" name="Freeform 7">
+              <a:extLst>
+                <a:ext uri="{FF2B5EF4-FFF2-40B4-BE49-F238E27FC236}">
+                  <a16:creationId xmlns:a16="http://schemas.microsoft.com/office/drawing/2014/main" id="{DB110D97-363A-40D5-98E8-D367DFCFB235}"/>
+                </a:ext>
+                <a:ext uri="{C183D7F6-B498-43B3-948B-1728B52AA6E4}">
+                  <adec:decorative xmlns:adec="http://schemas.microsoft.com/office/drawing/2017/decorative" val="1"/>
+                </a:ext>
+              </a:extLst>
+            </p:cNvPr>
+            <p:cNvSpPr/>
+            <p:nvPr>
+              <p:extLst>
+                <p:ext uri="{386F3935-93C4-4BCD-93E2-E3B085C9AB24}">
+                  <p16:designElem xmlns:p16="http://schemas.microsoft.com/office/powerpoint/2015/main" val="1"/>
+                </p:ext>
+              </p:extLst>
+            </p:nvPr>
+          </p:nvSpPr>
+          <p:spPr bwMode="auto">
+            <a:xfrm>
+              <a:off x="2928938" y="-4763"/>
+              <a:ext cx="1035050" cy="2673350"/>
+            </a:xfrm>
+            <a:custGeom>
+              <a:avLst/>
+              <a:gdLst/>
+              <a:ahLst/>
+              <a:cxnLst/>
+              <a:rect l="0" t="0" r="r" b="b"/>
+              <a:pathLst>
+                <a:path w="652" h="1684">
+                  <a:moveTo>
+                    <a:pt x="225" y="1684"/>
+                  </a:moveTo>
+                  <a:lnTo>
+                    <a:pt x="652" y="0"/>
+                  </a:lnTo>
+                  <a:lnTo>
+                    <a:pt x="411" y="0"/>
+                  </a:lnTo>
+                  <a:lnTo>
+                    <a:pt x="0" y="1627"/>
+                  </a:lnTo>
+                  <a:lnTo>
+                    <a:pt x="219" y="1681"/>
+                  </a:lnTo>
+                  <a:lnTo>
+                    <a:pt x="225" y="1684"/>
+                  </a:lnTo>
+                  <a:close/>
+                </a:path>
+              </a:pathLst>
+            </a:custGeom>
+            <a:solidFill>
+              <a:schemeClr val="tx1">
+                <a:lumMod val="65000"/>
+                <a:lumOff val="35000"/>
+              </a:schemeClr>
+            </a:solidFill>
+            <a:ln>
+              <a:noFill/>
+            </a:ln>
+          </p:spPr>
+        </p:sp>
+        <p:sp>
+          <p:nvSpPr>
+            <p:cNvPr id="36" name="Freeform 9">
+              <a:extLst>
+                <a:ext uri="{FF2B5EF4-FFF2-40B4-BE49-F238E27FC236}">
+                  <a16:creationId xmlns:a16="http://schemas.microsoft.com/office/drawing/2014/main" id="{30DC9DB4-96D0-47E9-A6E5-1590DED848FE}"/>
+                </a:ext>
+                <a:ext uri="{C183D7F6-B498-43B3-948B-1728B52AA6E4}">
+                  <adec:decorative xmlns:adec="http://schemas.microsoft.com/office/drawing/2017/decorative" val="1"/>
+                </a:ext>
+              </a:extLst>
+            </p:cNvPr>
+            <p:cNvSpPr/>
+            <p:nvPr>
+              <p:extLst>
+                <p:ext uri="{386F3935-93C4-4BCD-93E2-E3B085C9AB24}">
+                  <p16:designElem xmlns:p16="http://schemas.microsoft.com/office/powerpoint/2015/main" val="1"/>
+                </p:ext>
+              </p:extLst>
+            </p:nvPr>
+          </p:nvSpPr>
+          <p:spPr bwMode="auto">
+            <a:xfrm>
+              <a:off x="2928938" y="2582862"/>
+              <a:ext cx="2693987" cy="4275138"/>
+            </a:xfrm>
+            <a:custGeom>
+              <a:avLst/>
+              <a:gdLst/>
+              <a:ahLst/>
+              <a:cxnLst/>
+              <a:rect l="0" t="0" r="r" b="b"/>
+              <a:pathLst>
+                <a:path w="1697" h="2693">
+                  <a:moveTo>
+                    <a:pt x="0" y="0"/>
+                  </a:moveTo>
+                  <a:lnTo>
+                    <a:pt x="1622" y="2693"/>
+                  </a:lnTo>
+                  <a:lnTo>
+                    <a:pt x="1697" y="2693"/>
+                  </a:lnTo>
+                  <a:lnTo>
+                    <a:pt x="0" y="0"/>
+                  </a:lnTo>
+                  <a:close/>
+                </a:path>
+              </a:pathLst>
+            </a:custGeom>
+            <a:solidFill>
+              <a:schemeClr val="tx1">
+                <a:lumMod val="85000"/>
+                <a:lumOff val="15000"/>
+              </a:schemeClr>
+            </a:solidFill>
+            <a:ln>
+              <a:noFill/>
+            </a:ln>
+          </p:spPr>
+        </p:sp>
+        <p:sp>
+          <p:nvSpPr>
+            <p:cNvPr id="37" name="Freeform 10">
+              <a:extLst>
+                <a:ext uri="{FF2B5EF4-FFF2-40B4-BE49-F238E27FC236}">
+                  <a16:creationId xmlns:a16="http://schemas.microsoft.com/office/drawing/2014/main" id="{8CA317D7-424B-4887-BEDF-18EF7915C5C1}"/>
+                </a:ext>
+                <a:ext uri="{C183D7F6-B498-43B3-948B-1728B52AA6E4}">
+                  <adec:decorative xmlns:adec="http://schemas.microsoft.com/office/drawing/2017/decorative" val="1"/>
+                </a:ext>
+              </a:extLst>
+            </p:cNvPr>
+            <p:cNvSpPr/>
+            <p:nvPr>
+              <p:extLst>
+                <p:ext uri="{386F3935-93C4-4BCD-93E2-E3B085C9AB24}">
+                  <p16:designElem xmlns:p16="http://schemas.microsoft.com/office/powerpoint/2015/main" val="1"/>
+                </p:ext>
+              </p:extLst>
+            </p:nvPr>
+          </p:nvSpPr>
+          <p:spPr bwMode="auto">
+            <a:xfrm>
+              <a:off x="3371850" y="2692400"/>
+              <a:ext cx="3332162" cy="4165600"/>
+            </a:xfrm>
+            <a:custGeom>
+              <a:avLst/>
+              <a:gdLst/>
+              <a:ahLst/>
+              <a:cxnLst/>
+              <a:rect l="0" t="0" r="r" b="b"/>
+              <a:pathLst>
+                <a:path w="2099" h="2624">
+                  <a:moveTo>
+                    <a:pt x="2099" y="2624"/>
+                  </a:moveTo>
+                  <a:lnTo>
+                    <a:pt x="0" y="0"/>
+                  </a:lnTo>
+                  <a:lnTo>
+                    <a:pt x="2021" y="2624"/>
+                  </a:lnTo>
+                  <a:lnTo>
+                    <a:pt x="2099" y="2624"/>
+                  </a:lnTo>
+                  <a:close/>
+                </a:path>
+              </a:pathLst>
+            </a:custGeom>
+            <a:solidFill>
+              <a:schemeClr val="accent1">
+                <a:lumMod val="50000"/>
+              </a:schemeClr>
+            </a:solidFill>
+            <a:ln>
+              <a:noFill/>
+            </a:ln>
+          </p:spPr>
+        </p:sp>
+        <p:sp>
+          <p:nvSpPr>
+            <p:cNvPr id="38" name="Freeform 11">
+              <a:extLst>
+                <a:ext uri="{FF2B5EF4-FFF2-40B4-BE49-F238E27FC236}">
+                  <a16:creationId xmlns:a16="http://schemas.microsoft.com/office/drawing/2014/main" id="{ACF40F67-B16B-4E7F-A595-0EF370063DF0}"/>
+                </a:ext>
+                <a:ext uri="{C183D7F6-B498-43B3-948B-1728B52AA6E4}">
+                  <adec:decorative xmlns:adec="http://schemas.microsoft.com/office/drawing/2017/decorative" val="1"/>
+                </a:ext>
+              </a:extLst>
+            </p:cNvPr>
+            <p:cNvSpPr/>
+            <p:nvPr>
+              <p:extLst>
+                <p:ext uri="{386F3935-93C4-4BCD-93E2-E3B085C9AB24}">
+                  <p16:designElem xmlns:p16="http://schemas.microsoft.com/office/powerpoint/2015/main" val="1"/>
+                </p:ext>
+              </p:extLst>
+            </p:nvPr>
+          </p:nvSpPr>
+          <p:spPr bwMode="auto">
+            <a:xfrm>
+              <a:off x="3367088" y="2687637"/>
+              <a:ext cx="4576762" cy="4170363"/>
+            </a:xfrm>
+            <a:custGeom>
+              <a:avLst/>
+              <a:gdLst/>
+              <a:ahLst/>
+              <a:cxnLst/>
+              <a:rect l="0" t="0" r="r" b="b"/>
+              <a:pathLst>
+                <a:path w="2883" h="2627">
+                  <a:moveTo>
+                    <a:pt x="0" y="0"/>
+                  </a:moveTo>
+                  <a:lnTo>
+                    <a:pt x="3" y="3"/>
+                  </a:lnTo>
+                  <a:lnTo>
+                    <a:pt x="2102" y="2627"/>
+                  </a:lnTo>
+                  <a:lnTo>
+                    <a:pt x="2883" y="2627"/>
+                  </a:lnTo>
+                  <a:lnTo>
+                    <a:pt x="225" y="57"/>
+                  </a:lnTo>
+                  <a:lnTo>
+                    <a:pt x="0" y="0"/>
+                  </a:lnTo>
+                  <a:close/>
+                </a:path>
+              </a:pathLst>
+            </a:custGeom>
+            <a:solidFill>
+              <a:schemeClr val="accent1">
+                <a:lumMod val="75000"/>
+              </a:schemeClr>
+            </a:solidFill>
+            <a:ln>
+              <a:noFill/>
+            </a:ln>
+          </p:spPr>
+        </p:sp>
+        <p:sp>
+          <p:nvSpPr>
+            <p:cNvPr id="39" name="Freeform 12">
+              <a:extLst>
+                <a:ext uri="{FF2B5EF4-FFF2-40B4-BE49-F238E27FC236}">
+                  <a16:creationId xmlns:a16="http://schemas.microsoft.com/office/drawing/2014/main" id="{EB2264F1-4BB6-4403-A681-A463AA730397}"/>
+                </a:ext>
+                <a:ext uri="{C183D7F6-B498-43B3-948B-1728B52AA6E4}">
+                  <adec:decorative xmlns:adec="http://schemas.microsoft.com/office/drawing/2017/decorative" val="1"/>
+                </a:ext>
+              </a:extLst>
+            </p:cNvPr>
+            <p:cNvSpPr/>
+            <p:nvPr>
+              <p:extLst>
+                <p:ext uri="{386F3935-93C4-4BCD-93E2-E3B085C9AB24}">
+                  <p16:designElem xmlns:p16="http://schemas.microsoft.com/office/powerpoint/2015/main" val="1"/>
+                </p:ext>
+              </p:extLst>
+            </p:nvPr>
+          </p:nvSpPr>
+          <p:spPr bwMode="auto">
+            <a:xfrm>
+              <a:off x="2928938" y="2578100"/>
+              <a:ext cx="3584575" cy="4279900"/>
+            </a:xfrm>
+            <a:custGeom>
+              <a:avLst/>
+              <a:gdLst/>
+              <a:ahLst/>
+              <a:cxnLst/>
+              <a:rect l="0" t="0" r="r" b="b"/>
+              <a:pathLst>
+                <a:path w="2258" h="2696">
+                  <a:moveTo>
+                    <a:pt x="2258" y="2696"/>
+                  </a:moveTo>
+                  <a:lnTo>
+                    <a:pt x="264" y="111"/>
+                  </a:lnTo>
+                  <a:lnTo>
+                    <a:pt x="228" y="60"/>
+                  </a:lnTo>
+                  <a:lnTo>
+                    <a:pt x="225" y="57"/>
+                  </a:lnTo>
+                  <a:lnTo>
+                    <a:pt x="0" y="0"/>
+                  </a:lnTo>
+                  <a:lnTo>
+                    <a:pt x="0" y="3"/>
+                  </a:lnTo>
+                  <a:lnTo>
+                    <a:pt x="1697" y="2696"/>
+                  </a:lnTo>
+                  <a:lnTo>
+                    <a:pt x="2258" y="2696"/>
+                  </a:lnTo>
+                  <a:close/>
+                </a:path>
+              </a:pathLst>
+            </a:custGeom>
+            <a:solidFill>
+              <a:schemeClr val="tx1">
+                <a:lumMod val="75000"/>
+                <a:lumOff val="25000"/>
+              </a:schemeClr>
+            </a:solidFill>
+            <a:ln>
+              <a:noFill/>
+            </a:ln>
+          </p:spPr>
+        </p:sp>
+      </p:grpSp>
+      <p:sp useBgFill="1">
+        <p:nvSpPr>
+          <p:cNvPr id="41" name="Rectangle 40">
+            <a:extLst>
+              <a:ext uri="{FF2B5EF4-FFF2-40B4-BE49-F238E27FC236}">
+                <a16:creationId xmlns:a16="http://schemas.microsoft.com/office/drawing/2014/main" id="{F9DFC70C-0B30-4D8A-ACCE-E112906E637F}"/>
+              </a:ext>
+              <a:ext uri="{C183D7F6-B498-43B3-948B-1728B52AA6E4}">
+                <adec:decorative xmlns:adec="http://schemas.microsoft.com/office/drawing/2017/decorative" val="1"/>
+              </a:ext>
+            </a:extLst>
+          </p:cNvPr>
+          <p:cNvSpPr>
+            <a:spLocks noGrp="1" noRot="1" noChangeAspect="1" noMove="1" noResize="1" noEditPoints="1" noAdjustHandles="1" noChangeArrowheads="1" noChangeShapeType="1" noTextEdit="1"/>
+          </p:cNvSpPr>
+          <p:nvPr>
+            <p:extLst>
+              <p:ext uri="{386F3935-93C4-4BCD-93E2-E3B085C9AB24}">
+                <p16:designElem xmlns:p16="http://schemas.microsoft.com/office/powerpoint/2015/main" val="1"/>
+              </p:ext>
+            </p:extLst>
+          </p:nvPr>
+        </p:nvSpPr>
+        <p:spPr>
+          <a:xfrm>
+            <a:off x="0" y="0"/>
+            <a:ext cx="18288000" cy="10287000"/>
+          </a:xfrm>
+          <a:prstGeom prst="rect">
+            <a:avLst/>
+          </a:prstGeom>
+          <a:ln>
+            <a:noFill/>
+          </a:ln>
+        </p:spPr>
+        <p:style>
+          <a:lnRef idx="2">
+            <a:schemeClr val="accent1">
+              <a:shade val="50000"/>
+            </a:schemeClr>
+          </a:lnRef>
+          <a:fillRef idx="1">
+            <a:schemeClr val="accent1"/>
+          </a:fillRef>
+          <a:effectRef idx="0">
+            <a:schemeClr val="accent1"/>
+          </a:effectRef>
+          <a:fontRef idx="minor">
+            <a:schemeClr val="lt1"/>
+          </a:fontRef>
+        </p:style>
+        <p:txBody>
+          <a:bodyPr rtlCol="0" anchor="ctr"/>
+          <a:lstStyle/>
+          <a:p>
+            <a:pPr algn="ctr"/>
+            <a:endParaRPr lang="en-US"/>
+          </a:p>
+        </p:txBody>
+      </p:sp>
+      <p:sp>
+        <p:nvSpPr>
+          <p:cNvPr id="43" name="Freeform 8">
+            <a:extLst>
+              <a:ext uri="{FF2B5EF4-FFF2-40B4-BE49-F238E27FC236}">
+                <a16:creationId xmlns:a16="http://schemas.microsoft.com/office/drawing/2014/main" id="{C5078CE6-CE6B-4EB4-BE80-35B2D5EAB72B}"/>
+              </a:ext>
+              <a:ext uri="{C183D7F6-B498-43B3-948B-1728B52AA6E4}">
+                <adec:decorative xmlns:adec="http://schemas.microsoft.com/office/drawing/2017/decorative" val="1"/>
+              </a:ext>
+            </a:extLst>
+          </p:cNvPr>
+          <p:cNvSpPr>
+            <a:spLocks noGrp="1" noRot="1" noChangeAspect="1" noMove="1" noResize="1" noEditPoints="1" noAdjustHandles="1" noChangeArrowheads="1" noChangeShapeType="1" noTextEdit="1"/>
+          </p:cNvSpPr>
+          <p:nvPr>
+            <p:extLst>
+              <p:ext uri="{386F3935-93C4-4BCD-93E2-E3B085C9AB24}">
+                <p16:designElem xmlns:p16="http://schemas.microsoft.com/office/powerpoint/2015/main" val="1"/>
+              </p:ext>
+            </p:extLst>
+          </p:nvPr>
+        </p:nvSpPr>
+        <p:spPr bwMode="white">
+          <a:xfrm>
+            <a:off x="-25399" y="-25399"/>
+            <a:ext cx="11010899" cy="10325099"/>
+          </a:xfrm>
+          <a:custGeom>
+            <a:avLst/>
+            <a:gdLst>
+              <a:gd name="connsiteX0" fmla="*/ 5427133 w 7340600"/>
+              <a:gd name="connsiteY0" fmla="*/ 8466 h 6883400"/>
+              <a:gd name="connsiteX1" fmla="*/ 4783666 w 7340600"/>
+              <a:gd name="connsiteY1" fmla="*/ 2573866 h 6883400"/>
+              <a:gd name="connsiteX2" fmla="*/ 7340600 w 7340600"/>
+              <a:gd name="connsiteY2" fmla="*/ 6874933 h 6883400"/>
+              <a:gd name="connsiteX3" fmla="*/ 0 w 7340600"/>
+              <a:gd name="connsiteY3" fmla="*/ 6883400 h 6883400"/>
+              <a:gd name="connsiteX4" fmla="*/ 8466 w 7340600"/>
+              <a:gd name="connsiteY4" fmla="*/ 0 h 6883400"/>
+              <a:gd name="connsiteX5" fmla="*/ 5427133 w 7340600"/>
+              <a:gd name="connsiteY5" fmla="*/ 8466 h 6883400"/>
+            </a:gdLst>
+            <a:ahLst/>
+            <a:cxnLst>
+              <a:cxn ang="0">
+                <a:pos x="connsiteX0" y="connsiteY0"/>
+              </a:cxn>
+              <a:cxn ang="0">
+                <a:pos x="connsiteX1" y="connsiteY1"/>
+              </a:cxn>
+              <a:cxn ang="0">
+                <a:pos x="connsiteX2" y="connsiteY2"/>
+              </a:cxn>
+              <a:cxn ang="0">
+                <a:pos x="connsiteX3" y="connsiteY3"/>
+              </a:cxn>
+              <a:cxn ang="0">
+                <a:pos x="connsiteX4" y="connsiteY4"/>
+              </a:cxn>
+              <a:cxn ang="0">
+                <a:pos x="connsiteX5" y="connsiteY5"/>
+              </a:cxn>
+            </a:cxnLst>
+            <a:rect l="l" t="t" r="r" b="b"/>
+            <a:pathLst>
+              <a:path w="7340600" h="6883400">
+                <a:moveTo>
+                  <a:pt x="5427133" y="8466"/>
+                </a:moveTo>
+                <a:lnTo>
+                  <a:pt x="4783666" y="2573866"/>
+                </a:lnTo>
+                <a:lnTo>
+                  <a:pt x="7340600" y="6874933"/>
+                </a:lnTo>
+                <a:lnTo>
+                  <a:pt x="0" y="6883400"/>
+                </a:lnTo>
+                <a:lnTo>
+                  <a:pt x="8466" y="0"/>
+                </a:lnTo>
+                <a:lnTo>
+                  <a:pt x="5427133" y="8466"/>
+                </a:lnTo>
+                <a:close/>
+              </a:path>
+            </a:pathLst>
+          </a:custGeom>
+          <a:solidFill>
+            <a:schemeClr val="tx1">
+              <a:lumMod val="95000"/>
+              <a:lumOff val="5000"/>
+              <a:alpha val="80000"/>
+            </a:schemeClr>
+          </a:solidFill>
+          <a:ln>
+            <a:noFill/>
+          </a:ln>
+          <a:effectLst/>
+        </p:spPr>
+        <p:style>
+          <a:lnRef idx="1">
+            <a:schemeClr val="accent1"/>
+          </a:lnRef>
+          <a:fillRef idx="3">
+            <a:schemeClr val="accent1"/>
+          </a:fillRef>
+          <a:effectRef idx="2">
+            <a:schemeClr val="accent1"/>
+          </a:effectRef>
+          <a:fontRef idx="minor">
+            <a:schemeClr val="lt1"/>
+          </a:fontRef>
+        </p:style>
+        <p:txBody>
+          <a:bodyPr rtlCol="0" anchor="ctr"/>
+          <a:lstStyle/>
+          <a:p>
+            <a:pPr algn="ctr"/>
+            <a:endParaRPr lang="en-US"/>
+          </a:p>
+        </p:txBody>
+      </p:sp>
       <p:sp>
         <p:nvSpPr>
           <p:cNvPr id="2" name="TextBox 2"/>
@@ -15637,45 +16252,627 @@
         </p:nvSpPr>
         <p:spPr>
           <a:xfrm>
-            <a:off x="1380226" y="866775"/>
-            <a:ext cx="16907774" cy="3133725"/>
+            <a:off x="141194" y="-63501"/>
+            <a:ext cx="7815635" cy="3733800"/>
           </a:xfrm>
           <a:prstGeom prst="rect">
             <a:avLst/>
           </a:prstGeom>
+          <a:effectLst/>
         </p:spPr>
         <p:txBody>
-          <a:bodyPr wrap="square" lIns="0" tIns="0" rIns="0" bIns="0" rtlCol="0" anchor="t">
+          <a:bodyPr vert="horz" lIns="91440" tIns="45720" rIns="91440" bIns="45720" rtlCol="0" anchor="b">
+            <a:normAutofit/>
+          </a:bodyPr>
+          <a:lstStyle/>
+          <a:p>
+            <a:pPr defTabSz="457200">
+              <a:lnSpc>
+                <a:spcPct val="90000"/>
+              </a:lnSpc>
+              <a:spcBef>
+                <a:spcPct val="0"/>
+              </a:spcBef>
+              <a:spcAft>
+                <a:spcPts val="600"/>
+              </a:spcAft>
+            </a:pPr>
+            <a:r>
+              <a:rPr lang="en-US" sz="9600" b="1" dirty="0">
+                <a:ln w="3175" cmpd="sng">
+                  <a:noFill/>
+                </a:ln>
+                <a:solidFill>
+                  <a:schemeClr val="bg1"/>
+                </a:solidFill>
+                <a:latin typeface="+mj-lt"/>
+                <a:ea typeface="+mj-ea"/>
+                <a:cs typeface="+mj-cs"/>
+              </a:rPr>
+              <a:t>My Background: </a:t>
+            </a:r>
+            <a:endParaRPr lang="en-US" sz="6900" b="1">
+              <a:ln w="3175" cmpd="sng">
+                <a:noFill/>
+              </a:ln>
+              <a:solidFill>
+                <a:schemeClr val="bg1"/>
+              </a:solidFill>
+              <a:latin typeface="+mj-lt"/>
+              <a:ea typeface="+mj-ea"/>
+              <a:cs typeface="+mj-cs"/>
+            </a:endParaRPr>
+          </a:p>
+        </p:txBody>
+      </p:sp>
+      <p:grpSp>
+        <p:nvGrpSpPr>
+          <p:cNvPr id="45" name="Group 44">
+            <a:extLst>
+              <a:ext uri="{FF2B5EF4-FFF2-40B4-BE49-F238E27FC236}">
+                <a16:creationId xmlns:a16="http://schemas.microsoft.com/office/drawing/2014/main" id="{1FE3F97D-27C5-498C-A189-D1D4ADE014C2}"/>
+              </a:ext>
+              <a:ext uri="{C183D7F6-B498-43B3-948B-1728B52AA6E4}">
+                <adec:decorative xmlns:adec="http://schemas.microsoft.com/office/drawing/2017/decorative" val="1"/>
+              </a:ext>
+            </a:extLst>
+          </p:cNvPr>
+          <p:cNvGrpSpPr>
+            <a:grpSpLocks noGrp="1" noUngrp="1" noRot="1" noChangeAspect="1" noMove="1" noResize="1"/>
+          </p:cNvGrpSpPr>
+          <p:nvPr>
+            <p:extLst>
+              <p:ext uri="{386F3935-93C4-4BCD-93E2-E3B085C9AB24}">
+                <p16:designElem xmlns:p16="http://schemas.microsoft.com/office/powerpoint/2015/main" val="1"/>
+              </p:ext>
+            </p:extLst>
+          </p:nvPr>
+        </p:nvGrpSpPr>
+        <p:grpSpPr>
+          <a:xfrm>
+            <a:off x="7296151" y="-7144"/>
+            <a:ext cx="7522369" cy="10294145"/>
+            <a:chOff x="2928938" y="-4763"/>
+            <a:chExt cx="5014912" cy="6862763"/>
+          </a:xfrm>
+        </p:grpSpPr>
+        <p:sp>
+          <p:nvSpPr>
+            <p:cNvPr id="46" name="Freeform 6">
+              <a:extLst>
+                <a:ext uri="{FF2B5EF4-FFF2-40B4-BE49-F238E27FC236}">
+                  <a16:creationId xmlns:a16="http://schemas.microsoft.com/office/drawing/2014/main" id="{E16A77AE-FC02-41D6-84BA-87C5D2842B88}"/>
+                </a:ext>
+                <a:ext uri="{C183D7F6-B498-43B3-948B-1728B52AA6E4}">
+                  <adec:decorative xmlns:adec="http://schemas.microsoft.com/office/drawing/2017/decorative" val="1"/>
+                </a:ext>
+              </a:extLst>
+            </p:cNvPr>
+            <p:cNvSpPr/>
+            <p:nvPr>
+              <p:extLst>
+                <p:ext uri="{386F3935-93C4-4BCD-93E2-E3B085C9AB24}">
+                  <p16:designElem xmlns:p16="http://schemas.microsoft.com/office/powerpoint/2015/main" val="1"/>
+                </p:ext>
+              </p:extLst>
+            </p:nvPr>
+          </p:nvSpPr>
+          <p:spPr bwMode="auto">
+            <a:xfrm>
+              <a:off x="3367088" y="-4763"/>
+              <a:ext cx="1063625" cy="2782888"/>
+            </a:xfrm>
+            <a:custGeom>
+              <a:avLst/>
+              <a:gdLst/>
+              <a:ahLst/>
+              <a:cxnLst/>
+              <a:rect l="0" t="0" r="r" b="b"/>
+              <a:pathLst>
+                <a:path w="670" h="1753">
+                  <a:moveTo>
+                    <a:pt x="0" y="1696"/>
+                  </a:moveTo>
+                  <a:lnTo>
+                    <a:pt x="225" y="1753"/>
+                  </a:lnTo>
+                  <a:lnTo>
+                    <a:pt x="670" y="0"/>
+                  </a:lnTo>
+                  <a:lnTo>
+                    <a:pt x="430" y="0"/>
+                  </a:lnTo>
+                  <a:lnTo>
+                    <a:pt x="0" y="1696"/>
+                  </a:lnTo>
+                  <a:close/>
+                </a:path>
+              </a:pathLst>
+            </a:custGeom>
+            <a:solidFill>
+              <a:schemeClr val="accent1"/>
+            </a:solidFill>
+            <a:ln>
+              <a:noFill/>
+            </a:ln>
+          </p:spPr>
+        </p:sp>
+        <p:sp>
+          <p:nvSpPr>
+            <p:cNvPr id="47" name="Freeform 7">
+              <a:extLst>
+                <a:ext uri="{FF2B5EF4-FFF2-40B4-BE49-F238E27FC236}">
+                  <a16:creationId xmlns:a16="http://schemas.microsoft.com/office/drawing/2014/main" id="{5AC60704-A008-45AB-86B8-68AE06B21C83}"/>
+                </a:ext>
+                <a:ext uri="{C183D7F6-B498-43B3-948B-1728B52AA6E4}">
+                  <adec:decorative xmlns:adec="http://schemas.microsoft.com/office/drawing/2017/decorative" val="1"/>
+                </a:ext>
+              </a:extLst>
+            </p:cNvPr>
+            <p:cNvSpPr/>
+            <p:nvPr>
+              <p:extLst>
+                <p:ext uri="{386F3935-93C4-4BCD-93E2-E3B085C9AB24}">
+                  <p16:designElem xmlns:p16="http://schemas.microsoft.com/office/powerpoint/2015/main" val="1"/>
+                </p:ext>
+              </p:extLst>
+            </p:nvPr>
+          </p:nvSpPr>
+          <p:spPr bwMode="auto">
+            <a:xfrm>
+              <a:off x="2928938" y="-4763"/>
+              <a:ext cx="1035050" cy="2673350"/>
+            </a:xfrm>
+            <a:custGeom>
+              <a:avLst/>
+              <a:gdLst/>
+              <a:ahLst/>
+              <a:cxnLst/>
+              <a:rect l="0" t="0" r="r" b="b"/>
+              <a:pathLst>
+                <a:path w="652" h="1684">
+                  <a:moveTo>
+                    <a:pt x="225" y="1684"/>
+                  </a:moveTo>
+                  <a:lnTo>
+                    <a:pt x="652" y="0"/>
+                  </a:lnTo>
+                  <a:lnTo>
+                    <a:pt x="411" y="0"/>
+                  </a:lnTo>
+                  <a:lnTo>
+                    <a:pt x="0" y="1627"/>
+                  </a:lnTo>
+                  <a:lnTo>
+                    <a:pt x="219" y="1681"/>
+                  </a:lnTo>
+                  <a:lnTo>
+                    <a:pt x="225" y="1684"/>
+                  </a:lnTo>
+                  <a:close/>
+                </a:path>
+              </a:pathLst>
+            </a:custGeom>
+            <a:solidFill>
+              <a:schemeClr val="tx1">
+                <a:lumMod val="65000"/>
+                <a:lumOff val="35000"/>
+              </a:schemeClr>
+            </a:solidFill>
+            <a:ln>
+              <a:noFill/>
+            </a:ln>
+          </p:spPr>
+        </p:sp>
+        <p:sp>
+          <p:nvSpPr>
+            <p:cNvPr id="48" name="Freeform 12">
+              <a:extLst>
+                <a:ext uri="{FF2B5EF4-FFF2-40B4-BE49-F238E27FC236}">
+                  <a16:creationId xmlns:a16="http://schemas.microsoft.com/office/drawing/2014/main" id="{6D4F05EC-AD9F-40D6-8289-ED803214275F}"/>
+                </a:ext>
+                <a:ext uri="{C183D7F6-B498-43B3-948B-1728B52AA6E4}">
+                  <adec:decorative xmlns:adec="http://schemas.microsoft.com/office/drawing/2017/decorative" val="1"/>
+                </a:ext>
+              </a:extLst>
+            </p:cNvPr>
+            <p:cNvSpPr/>
+            <p:nvPr>
+              <p:extLst>
+                <p:ext uri="{386F3935-93C4-4BCD-93E2-E3B085C9AB24}">
+                  <p16:designElem xmlns:p16="http://schemas.microsoft.com/office/powerpoint/2015/main" val="1"/>
+                </p:ext>
+              </p:extLst>
+            </p:nvPr>
+          </p:nvSpPr>
+          <p:spPr bwMode="auto">
+            <a:xfrm>
+              <a:off x="2928938" y="2582862"/>
+              <a:ext cx="2693987" cy="4275138"/>
+            </a:xfrm>
+            <a:custGeom>
+              <a:avLst/>
+              <a:gdLst/>
+              <a:ahLst/>
+              <a:cxnLst/>
+              <a:rect l="0" t="0" r="r" b="b"/>
+              <a:pathLst>
+                <a:path w="1697" h="2693">
+                  <a:moveTo>
+                    <a:pt x="0" y="0"/>
+                  </a:moveTo>
+                  <a:lnTo>
+                    <a:pt x="1622" y="2693"/>
+                  </a:lnTo>
+                  <a:lnTo>
+                    <a:pt x="1697" y="2693"/>
+                  </a:lnTo>
+                  <a:lnTo>
+                    <a:pt x="0" y="0"/>
+                  </a:lnTo>
+                  <a:close/>
+                </a:path>
+              </a:pathLst>
+            </a:custGeom>
+            <a:solidFill>
+              <a:schemeClr val="tx1">
+                <a:lumMod val="85000"/>
+                <a:lumOff val="15000"/>
+              </a:schemeClr>
+            </a:solidFill>
+            <a:ln>
+              <a:noFill/>
+            </a:ln>
+          </p:spPr>
+        </p:sp>
+        <p:sp>
+          <p:nvSpPr>
+            <p:cNvPr id="49" name="Freeform 13">
+              <a:extLst>
+                <a:ext uri="{FF2B5EF4-FFF2-40B4-BE49-F238E27FC236}">
+                  <a16:creationId xmlns:a16="http://schemas.microsoft.com/office/drawing/2014/main" id="{E1AEBD23-D7CE-46D8-B8F4-0016B2F63CF0}"/>
+                </a:ext>
+                <a:ext uri="{C183D7F6-B498-43B3-948B-1728B52AA6E4}">
+                  <adec:decorative xmlns:adec="http://schemas.microsoft.com/office/drawing/2017/decorative" val="1"/>
+                </a:ext>
+              </a:extLst>
+            </p:cNvPr>
+            <p:cNvSpPr/>
+            <p:nvPr>
+              <p:extLst>
+                <p:ext uri="{386F3935-93C4-4BCD-93E2-E3B085C9AB24}">
+                  <p16:designElem xmlns:p16="http://schemas.microsoft.com/office/powerpoint/2015/main" val="1"/>
+                </p:ext>
+              </p:extLst>
+            </p:nvPr>
+          </p:nvSpPr>
+          <p:spPr bwMode="auto">
+            <a:xfrm>
+              <a:off x="3371850" y="2692400"/>
+              <a:ext cx="3332162" cy="4165600"/>
+            </a:xfrm>
+            <a:custGeom>
+              <a:avLst/>
+              <a:gdLst/>
+              <a:ahLst/>
+              <a:cxnLst/>
+              <a:rect l="0" t="0" r="r" b="b"/>
+              <a:pathLst>
+                <a:path w="2099" h="2624">
+                  <a:moveTo>
+                    <a:pt x="2099" y="2624"/>
+                  </a:moveTo>
+                  <a:lnTo>
+                    <a:pt x="0" y="0"/>
+                  </a:lnTo>
+                  <a:lnTo>
+                    <a:pt x="2021" y="2624"/>
+                  </a:lnTo>
+                  <a:lnTo>
+                    <a:pt x="2099" y="2624"/>
+                  </a:lnTo>
+                  <a:close/>
+                </a:path>
+              </a:pathLst>
+            </a:custGeom>
+            <a:solidFill>
+              <a:schemeClr val="accent1">
+                <a:lumMod val="50000"/>
+              </a:schemeClr>
+            </a:solidFill>
+            <a:ln>
+              <a:noFill/>
+            </a:ln>
+          </p:spPr>
+        </p:sp>
+        <p:sp>
+          <p:nvSpPr>
+            <p:cNvPr id="50" name="Freeform 14">
+              <a:extLst>
+                <a:ext uri="{FF2B5EF4-FFF2-40B4-BE49-F238E27FC236}">
+                  <a16:creationId xmlns:a16="http://schemas.microsoft.com/office/drawing/2014/main" id="{5E461B2A-6F25-4FD3-B8A8-8358718FB79C}"/>
+                </a:ext>
+                <a:ext uri="{C183D7F6-B498-43B3-948B-1728B52AA6E4}">
+                  <adec:decorative xmlns:adec="http://schemas.microsoft.com/office/drawing/2017/decorative" val="1"/>
+                </a:ext>
+              </a:extLst>
+            </p:cNvPr>
+            <p:cNvSpPr/>
+            <p:nvPr>
+              <p:extLst>
+                <p:ext uri="{386F3935-93C4-4BCD-93E2-E3B085C9AB24}">
+                  <p16:designElem xmlns:p16="http://schemas.microsoft.com/office/powerpoint/2015/main" val="1"/>
+                </p:ext>
+              </p:extLst>
+            </p:nvPr>
+          </p:nvSpPr>
+          <p:spPr bwMode="auto">
+            <a:xfrm>
+              <a:off x="3367088" y="2687637"/>
+              <a:ext cx="4576762" cy="4170363"/>
+            </a:xfrm>
+            <a:custGeom>
+              <a:avLst/>
+              <a:gdLst/>
+              <a:ahLst/>
+              <a:cxnLst/>
+              <a:rect l="0" t="0" r="r" b="b"/>
+              <a:pathLst>
+                <a:path w="2883" h="2627">
+                  <a:moveTo>
+                    <a:pt x="0" y="0"/>
+                  </a:moveTo>
+                  <a:lnTo>
+                    <a:pt x="3" y="3"/>
+                  </a:lnTo>
+                  <a:lnTo>
+                    <a:pt x="2102" y="2627"/>
+                  </a:lnTo>
+                  <a:lnTo>
+                    <a:pt x="2883" y="2627"/>
+                  </a:lnTo>
+                  <a:lnTo>
+                    <a:pt x="225" y="57"/>
+                  </a:lnTo>
+                  <a:lnTo>
+                    <a:pt x="0" y="0"/>
+                  </a:lnTo>
+                  <a:close/>
+                </a:path>
+              </a:pathLst>
+            </a:custGeom>
+            <a:solidFill>
+              <a:schemeClr val="accent1">
+                <a:lumMod val="75000"/>
+              </a:schemeClr>
+            </a:solidFill>
+            <a:ln>
+              <a:noFill/>
+            </a:ln>
+          </p:spPr>
+        </p:sp>
+        <p:sp>
+          <p:nvSpPr>
+            <p:cNvPr id="51" name="Freeform 15">
+              <a:extLst>
+                <a:ext uri="{FF2B5EF4-FFF2-40B4-BE49-F238E27FC236}">
+                  <a16:creationId xmlns:a16="http://schemas.microsoft.com/office/drawing/2014/main" id="{DC9F5BDD-A982-4275-A718-21F673A3CE42}"/>
+                </a:ext>
+                <a:ext uri="{C183D7F6-B498-43B3-948B-1728B52AA6E4}">
+                  <adec:decorative xmlns:adec="http://schemas.microsoft.com/office/drawing/2017/decorative" val="1"/>
+                </a:ext>
+              </a:extLst>
+            </p:cNvPr>
+            <p:cNvSpPr/>
+            <p:nvPr>
+              <p:extLst>
+                <p:ext uri="{386F3935-93C4-4BCD-93E2-E3B085C9AB24}">
+                  <p16:designElem xmlns:p16="http://schemas.microsoft.com/office/powerpoint/2015/main" val="1"/>
+                </p:ext>
+              </p:extLst>
+            </p:nvPr>
+          </p:nvSpPr>
+          <p:spPr bwMode="auto">
+            <a:xfrm>
+              <a:off x="2928938" y="2578100"/>
+              <a:ext cx="3584575" cy="4279900"/>
+            </a:xfrm>
+            <a:custGeom>
+              <a:avLst/>
+              <a:gdLst/>
+              <a:ahLst/>
+              <a:cxnLst/>
+              <a:rect l="0" t="0" r="r" b="b"/>
+              <a:pathLst>
+                <a:path w="2258" h="2696">
+                  <a:moveTo>
+                    <a:pt x="2258" y="2696"/>
+                  </a:moveTo>
+                  <a:lnTo>
+                    <a:pt x="264" y="111"/>
+                  </a:lnTo>
+                  <a:lnTo>
+                    <a:pt x="228" y="60"/>
+                  </a:lnTo>
+                  <a:lnTo>
+                    <a:pt x="225" y="57"/>
+                  </a:lnTo>
+                  <a:lnTo>
+                    <a:pt x="0" y="0"/>
+                  </a:lnTo>
+                  <a:lnTo>
+                    <a:pt x="0" y="3"/>
+                  </a:lnTo>
+                  <a:lnTo>
+                    <a:pt x="1697" y="2696"/>
+                  </a:lnTo>
+                  <a:lnTo>
+                    <a:pt x="2258" y="2696"/>
+                  </a:lnTo>
+                  <a:close/>
+                </a:path>
+              </a:pathLst>
+            </a:custGeom>
+            <a:solidFill>
+              <a:schemeClr val="tx1">
+                <a:lumMod val="75000"/>
+                <a:lumOff val="25000"/>
+              </a:schemeClr>
+            </a:solidFill>
+            <a:ln>
+              <a:noFill/>
+            </a:ln>
+          </p:spPr>
+        </p:sp>
+      </p:grpSp>
+      <p:pic>
+        <p:nvPicPr>
+          <p:cNvPr id="4" name="Picture 4">
+            <a:extLst>
+              <a:ext uri="{FF2B5EF4-FFF2-40B4-BE49-F238E27FC236}">
+                <a16:creationId xmlns:a16="http://schemas.microsoft.com/office/drawing/2014/main" id="{1F8E529F-D631-4505-BA67-15CCCA11E2E0}"/>
+              </a:ext>
+            </a:extLst>
+          </p:cNvPr>
+          <p:cNvPicPr>
+            <a:picLocks noChangeAspect="1"/>
+          </p:cNvPicPr>
+          <p:nvPr/>
+        </p:nvPicPr>
+        <p:blipFill rotWithShape="1">
+          <a:blip r:embed="rId2"/>
+          <a:srcRect t="6851" r="1" b="25689"/>
+          <a:stretch/>
+        </p:blipFill>
+        <p:spPr>
+          <a:xfrm>
+            <a:off x="8641626" y="10"/>
+            <a:ext cx="9646375" cy="6507461"/>
+          </a:xfrm>
+          <a:custGeom>
+            <a:avLst/>
+            <a:gdLst/>
+            <a:ahLst/>
+            <a:cxnLst/>
+            <a:rect l="l" t="t" r="r" b="b"/>
+            <a:pathLst>
+              <a:path w="6430917" h="4338314">
+                <a:moveTo>
+                  <a:pt x="712614" y="0"/>
+                </a:moveTo>
+                <a:lnTo>
+                  <a:pt x="6430917" y="0"/>
+                </a:lnTo>
+                <a:lnTo>
+                  <a:pt x="6430917" y="4338314"/>
+                </a:lnTo>
+                <a:lnTo>
+                  <a:pt x="0" y="2800083"/>
+                </a:lnTo>
+                <a:close/>
+              </a:path>
+            </a:pathLst>
+          </a:custGeom>
+        </p:spPr>
+      </p:pic>
+      <p:pic>
+        <p:nvPicPr>
+          <p:cNvPr id="5" name="Picture 5" descr="A picture containing text, clipart&#10;&#10;Description automatically generated">
+            <a:extLst>
+              <a:ext uri="{FF2B5EF4-FFF2-40B4-BE49-F238E27FC236}">
+                <a16:creationId xmlns:a16="http://schemas.microsoft.com/office/drawing/2014/main" id="{933085BD-24B5-4C75-9734-BF28CBF7F0BB}"/>
+              </a:ext>
+            </a:extLst>
+          </p:cNvPr>
+          <p:cNvPicPr>
+            <a:picLocks noChangeAspect="1"/>
+          </p:cNvPicPr>
+          <p:nvPr/>
+        </p:nvPicPr>
+        <p:blipFill rotWithShape="1">
+          <a:blip r:embed="rId3"/>
+          <a:srcRect t="14789" r="-1" b="22175"/>
+          <a:stretch/>
+        </p:blipFill>
+        <p:spPr>
+          <a:xfrm>
+            <a:off x="8625519" y="4196274"/>
+            <a:ext cx="9662481" cy="6090727"/>
+          </a:xfrm>
+          <a:custGeom>
+            <a:avLst/>
+            <a:gdLst/>
+            <a:ahLst/>
+            <a:cxnLst/>
+            <a:rect l="l" t="t" r="r" b="b"/>
+            <a:pathLst>
+              <a:path w="6441654" h="4060485">
+                <a:moveTo>
+                  <a:pt x="0" y="0"/>
+                </a:moveTo>
+                <a:lnTo>
+                  <a:pt x="6441654" y="1540800"/>
+                </a:lnTo>
+                <a:lnTo>
+                  <a:pt x="6441654" y="4060485"/>
+                </a:lnTo>
+                <a:lnTo>
+                  <a:pt x="4297229" y="4060485"/>
+                </a:lnTo>
+                <a:close/>
+              </a:path>
+            </a:pathLst>
+          </a:custGeom>
+        </p:spPr>
+      </p:pic>
+      <p:sp>
+        <p:nvSpPr>
+          <p:cNvPr id="7" name="TextBox 6">
+            <a:extLst>
+              <a:ext uri="{FF2B5EF4-FFF2-40B4-BE49-F238E27FC236}">
+                <a16:creationId xmlns:a16="http://schemas.microsoft.com/office/drawing/2014/main" id="{4326155A-F8F0-48CB-BAD6-AE8DBB64D0F6}"/>
+              </a:ext>
+            </a:extLst>
+          </p:cNvPr>
+          <p:cNvSpPr txBox="1"/>
+          <p:nvPr/>
+        </p:nvSpPr>
+        <p:spPr>
+          <a:xfrm>
+            <a:off x="1730439" y="4464808"/>
+            <a:ext cx="6172199" cy="1754326"/>
+          </a:xfrm>
+          <a:prstGeom prst="rect">
+            <a:avLst/>
+          </a:prstGeom>
+          <a:noFill/>
+        </p:spPr>
+        <p:txBody>
+          <a:bodyPr rot="0" spcFirstLastPara="0" vertOverflow="overflow" horzOverflow="overflow" vert="horz" wrap="square" lIns="91440" tIns="45720" rIns="91440" bIns="45720" numCol="1" spcCol="0" rtlCol="0" fromWordArt="0" anchor="t" anchorCtr="0" forceAA="0" compatLnSpc="1">
+            <a:prstTxWarp prst="textNoShape">
+              <a:avLst/>
+            </a:prstTxWarp>
             <a:spAutoFit/>
           </a:bodyPr>
           <a:lstStyle/>
           <a:p>
-            <a:pPr algn="ctr">
-              <a:lnSpc>
-                <a:spcPts val="12599"/>
-              </a:lnSpc>
-            </a:pPr>
             <a:r>
-              <a:rPr lang="en-US" sz="8000">
+              <a:rPr lang="en-US" sz="5400" b="1" dirty="0">
                 <a:solidFill>
-                  <a:schemeClr val="accent1"/>
+                  <a:schemeClr val="bg1"/>
                 </a:solidFill>
-                <a:latin typeface="Open Sans Extra Bold"/>
               </a:rPr>
-              <a:t>My Background: Medical vs Bank Cybersecurity</a:t>
+              <a:t>Medical vs Bank Cybersecurity</a:t>
             </a:r>
-            <a:endParaRPr lang="en-US" sz="8000">
-              <a:solidFill>
-                <a:schemeClr val="accent1"/>
-              </a:solidFill>
-              <a:latin typeface="Open Sans Extra Bold"/>
-              <a:ea typeface="Open Sans Extra Bold"/>
-              <a:cs typeface="Open Sans Extra Bold"/>
-            </a:endParaRPr>
           </a:p>
         </p:txBody>
       </p:sp>
     </p:spTree>
+    <p:extLst>
+      <p:ext uri="{BB962C8B-B14F-4D97-AF65-F5344CB8AC3E}">
+        <p14:creationId xmlns:p14="http://schemas.microsoft.com/office/powerpoint/2010/main" val="2891952695"/>
+      </p:ext>
+    </p:extLst>
   </p:cSld>
   <p:clrMapOvr>
     <a:masterClrMapping/>

</xml_diff>